<commit_message>
plot finished, ppt finished
</commit_message>
<xml_diff>
--- a/mexico city trip compa.pptx
+++ b/mexico city trip compa.pptx
@@ -5,7 +5,7 @@
     <p:sldMasterId id="2147483673" r:id="rId1"/>
   </p:sldMasterIdLst>
   <p:notesMasterIdLst>
-    <p:notesMasterId r:id="rId11"/>
+    <p:notesMasterId r:id="rId19"/>
   </p:notesMasterIdLst>
   <p:sldIdLst>
     <p:sldId id="256" r:id="rId2"/>
@@ -17,6 +17,14 @@
     <p:sldId id="262" r:id="rId8"/>
     <p:sldId id="263" r:id="rId9"/>
     <p:sldId id="264" r:id="rId10"/>
+    <p:sldId id="265" r:id="rId11"/>
+    <p:sldId id="266" r:id="rId12"/>
+    <p:sldId id="267" r:id="rId13"/>
+    <p:sldId id="268" r:id="rId14"/>
+    <p:sldId id="269" r:id="rId15"/>
+    <p:sldId id="270" r:id="rId16"/>
+    <p:sldId id="271" r:id="rId17"/>
+    <p:sldId id="272" r:id="rId18"/>
   </p:sldIdLst>
   <p:sldSz cx="12192000" cy="6858000"/>
   <p:notesSz cx="6858000" cy="9144000"/>
@@ -205,7 +213,7 @@
           <a:p>
             <a:fld id="{C7149E3F-ECDA-E249-AFAB-866AB257B76A}" type="datetimeFigureOut">
               <a:rPr lang="en-US" smtClean="0"/>
-              <a:t>8/25/25</a:t>
+              <a:t>9/1/25</a:t>
             </a:fld>
             <a:endParaRPr lang="en-US"/>
           </a:p>
@@ -640,6 +648,90 @@
 </p:notes>
 </file>
 
+<file path=ppt/notesSlides/notesSlide3.xml><?xml version="1.0" encoding="utf-8"?>
+<p:notes xmlns:a="http://schemas.openxmlformats.org/drawingml/2006/main" xmlns:r="http://schemas.openxmlformats.org/officeDocument/2006/relationships" xmlns:p="http://schemas.openxmlformats.org/presentationml/2006/main">
+  <p:cSld>
+    <p:spTree>
+      <p:nvGrpSpPr>
+        <p:cNvPr id="1" name=""/>
+        <p:cNvGrpSpPr/>
+        <p:nvPr/>
+      </p:nvGrpSpPr>
+      <p:grpSpPr>
+        <a:xfrm>
+          <a:off x="0" y="0"/>
+          <a:ext cx="0" cy="0"/>
+          <a:chOff x="0" y="0"/>
+          <a:chExt cx="0" cy="0"/>
+        </a:xfrm>
+      </p:grpSpPr>
+      <p:sp>
+        <p:nvSpPr>
+          <p:cNvPr id="2" name="Slide Image Placeholder 1"/>
+          <p:cNvSpPr>
+            <a:spLocks noGrp="1" noRot="1" noChangeAspect="1"/>
+          </p:cNvSpPr>
+          <p:nvPr>
+            <p:ph type="sldImg"/>
+          </p:nvPr>
+        </p:nvSpPr>
+        <p:spPr/>
+      </p:sp>
+      <p:sp>
+        <p:nvSpPr>
+          <p:cNvPr id="3" name="Notes Placeholder 2"/>
+          <p:cNvSpPr>
+            <a:spLocks noGrp="1"/>
+          </p:cNvSpPr>
+          <p:nvPr>
+            <p:ph type="body" idx="1"/>
+          </p:nvPr>
+        </p:nvSpPr>
+        <p:spPr/>
+        <p:txBody>
+          <a:bodyPr/>
+          <a:lstStyle/>
+          <a:p>
+            <a:endParaRPr lang="en-US" dirty="0"/>
+          </a:p>
+        </p:txBody>
+      </p:sp>
+      <p:sp>
+        <p:nvSpPr>
+          <p:cNvPr id="4" name="Slide Number Placeholder 3"/>
+          <p:cNvSpPr>
+            <a:spLocks noGrp="1"/>
+          </p:cNvSpPr>
+          <p:nvPr>
+            <p:ph type="sldNum" sz="quarter" idx="5"/>
+          </p:nvPr>
+        </p:nvSpPr>
+        <p:spPr/>
+        <p:txBody>
+          <a:bodyPr/>
+          <a:lstStyle/>
+          <a:p>
+            <a:fld id="{DE827478-09EF-0B4C-9DCA-90879BE15274}" type="slidenum">
+              <a:rPr lang="en-US" smtClean="0"/>
+              <a:t>13</a:t>
+            </a:fld>
+            <a:endParaRPr lang="en-US"/>
+          </a:p>
+        </p:txBody>
+      </p:sp>
+    </p:spTree>
+    <p:extLst>
+      <p:ext uri="{BB962C8B-B14F-4D97-AF65-F5344CB8AC3E}">
+        <p14:creationId xmlns:p14="http://schemas.microsoft.com/office/powerpoint/2010/main" val="1089204246"/>
+      </p:ext>
+    </p:extLst>
+  </p:cSld>
+  <p:clrMapOvr>
+    <a:masterClrMapping/>
+  </p:clrMapOvr>
+</p:notes>
+</file>
+
 <file path=ppt/slideLayouts/slideLayout1.xml><?xml version="1.0" encoding="utf-8"?>
 <p:sldLayout xmlns:a="http://schemas.openxmlformats.org/drawingml/2006/main" xmlns:r="http://schemas.openxmlformats.org/officeDocument/2006/relationships" xmlns:p="http://schemas.openxmlformats.org/presentationml/2006/main" type="title" preserve="1">
   <p:cSld name="Title Slide">
@@ -793,7 +885,7 @@
           <a:p>
             <a:fld id="{C128FA71-3A18-48C0-980F-4B68F7F63042}" type="datetime1">
               <a:rPr lang="en-US" smtClean="0"/>
-              <a:t>8/25/25</a:t>
+              <a:t>9/1/25</a:t>
             </a:fld>
             <a:endParaRPr lang="en-US"/>
           </a:p>
@@ -1001,7 +1093,7 @@
           <a:p>
             <a:fld id="{7104EDB3-C0E8-45F8-9E1D-1B6C8D1880C0}" type="datetime1">
               <a:rPr lang="en-US" smtClean="0"/>
-              <a:t>8/25/25</a:t>
+              <a:t>9/1/25</a:t>
             </a:fld>
             <a:endParaRPr lang="en-US"/>
           </a:p>
@@ -1211,7 +1303,7 @@
           <a:p>
             <a:fld id="{9CF0EC4B-54ED-4041-B552-9BA760FA3DBA}" type="datetime1">
               <a:rPr lang="en-US" smtClean="0"/>
-              <a:t>8/25/25</a:t>
+              <a:t>9/1/25</a:t>
             </a:fld>
             <a:endParaRPr lang="en-US"/>
           </a:p>
@@ -1409,7 +1501,7 @@
           <a:p>
             <a:fld id="{51C1210E-201E-4473-82AC-2466F5386C38}" type="datetime1">
               <a:rPr lang="en-US" smtClean="0"/>
-              <a:t>8/25/25</a:t>
+              <a:t>9/1/25</a:t>
             </a:fld>
             <a:endParaRPr lang="en-US"/>
           </a:p>
@@ -1687,7 +1779,7 @@
           <a:p>
             <a:fld id="{B01EA198-6CAB-4B8F-B93F-1F9C8C4B6CE7}" type="datetime1">
               <a:rPr lang="en-US" smtClean="0"/>
-              <a:t>8/25/25</a:t>
+              <a:t>9/1/25</a:t>
             </a:fld>
             <a:endParaRPr lang="en-US"/>
           </a:p>
@@ -1959,7 +2051,7 @@
           <a:p>
             <a:fld id="{CA06041F-4525-44D5-AA4F-332294BF1F56}" type="datetime1">
               <a:rPr lang="en-US" smtClean="0"/>
-              <a:t>8/25/25</a:t>
+              <a:t>9/1/25</a:t>
             </a:fld>
             <a:endParaRPr lang="en-US"/>
           </a:p>
@@ -2383,7 +2475,7 @@
           <a:p>
             <a:fld id="{F9557091-BBDF-4EB9-BA6B-2BB67AC4FC0F}" type="datetime1">
               <a:rPr lang="en-US" smtClean="0"/>
-              <a:t>8/25/25</a:t>
+              <a:t>9/1/25</a:t>
             </a:fld>
             <a:endParaRPr lang="en-US"/>
           </a:p>
@@ -2524,7 +2616,7 @@
           <a:p>
             <a:fld id="{2D6B226B-77A6-410C-9796-083F278E0125}" type="datetime1">
               <a:rPr lang="en-US" smtClean="0"/>
-              <a:t>8/25/25</a:t>
+              <a:t>9/1/25</a:t>
             </a:fld>
             <a:endParaRPr lang="en-US"/>
           </a:p>
@@ -2637,7 +2729,7 @@
           <a:p>
             <a:fld id="{A23A578B-D289-4C40-8593-3D356C49DA58}" type="datetime1">
               <a:rPr lang="en-US" smtClean="0"/>
-              <a:t>8/25/25</a:t>
+              <a:t>9/1/25</a:t>
             </a:fld>
             <a:endParaRPr lang="en-US"/>
           </a:p>
@@ -2956,7 +3048,7 @@
           <a:p>
             <a:fld id="{713DFAE3-14DB-48A7-A80F-80DDB072CE3D}" type="datetime1">
               <a:rPr lang="en-US" smtClean="0"/>
-              <a:t>8/25/25</a:t>
+              <a:t>9/1/25</a:t>
             </a:fld>
             <a:endParaRPr lang="en-US"/>
           </a:p>
@@ -3250,7 +3342,7 @@
           <a:p>
             <a:fld id="{92C5EAEF-6478-4102-8F5D-A5FE9FC97ACB}" type="datetime1">
               <a:rPr lang="en-US" smtClean="0"/>
-              <a:t>8/25/25</a:t>
+              <a:t>9/1/25</a:t>
             </a:fld>
             <a:endParaRPr lang="en-US"/>
           </a:p>
@@ -3491,7 +3583,7 @@
           <a:p>
             <a:fld id="{67F45AC6-C491-4585-A584-9CE2AF7D5500}" type="datetime1">
               <a:rPr lang="en-US" smtClean="0"/>
-              <a:t>8/25/25</a:t>
+              <a:t>9/1/25</a:t>
             </a:fld>
             <a:endParaRPr lang="en-US"/>
           </a:p>
@@ -4352,6 +4444,1410 @@
 </p:sld>
 </file>
 
+<file path=ppt/slides/slide10.xml><?xml version="1.0" encoding="utf-8"?>
+<p:sld xmlns:a="http://schemas.openxmlformats.org/drawingml/2006/main" xmlns:r="http://schemas.openxmlformats.org/officeDocument/2006/relationships" xmlns:p="http://schemas.openxmlformats.org/presentationml/2006/main">
+  <p:cSld>
+    <p:spTree>
+      <p:nvGrpSpPr>
+        <p:cNvPr id="1" name=""/>
+        <p:cNvGrpSpPr/>
+        <p:nvPr/>
+      </p:nvGrpSpPr>
+      <p:grpSpPr>
+        <a:xfrm>
+          <a:off x="0" y="0"/>
+          <a:ext cx="0" cy="0"/>
+          <a:chOff x="0" y="0"/>
+          <a:chExt cx="0" cy="0"/>
+        </a:xfrm>
+      </p:grpSpPr>
+      <p:sp>
+        <p:nvSpPr>
+          <p:cNvPr id="2" name="Title 1">
+            <a:extLst>
+              <a:ext uri="{FF2B5EF4-FFF2-40B4-BE49-F238E27FC236}">
+                <a16:creationId xmlns:a16="http://schemas.microsoft.com/office/drawing/2014/main" id="{9BD4689C-7E2A-F724-62AF-5333111E4FBF}"/>
+              </a:ext>
+            </a:extLst>
+          </p:cNvPr>
+          <p:cNvSpPr>
+            <a:spLocks noGrp="1"/>
+          </p:cNvSpPr>
+          <p:nvPr>
+            <p:ph type="title"/>
+          </p:nvPr>
+        </p:nvSpPr>
+        <p:spPr/>
+        <p:txBody>
+          <a:bodyPr/>
+          <a:lstStyle/>
+          <a:p>
+            <a:r>
+              <a:rPr lang="en-US" dirty="0"/>
+              <a:t>Weighted trip Analysis</a:t>
+            </a:r>
+          </a:p>
+        </p:txBody>
+      </p:sp>
+      <p:sp>
+        <p:nvSpPr>
+          <p:cNvPr id="3" name="Content Placeholder 2">
+            <a:extLst>
+              <a:ext uri="{FF2B5EF4-FFF2-40B4-BE49-F238E27FC236}">
+                <a16:creationId xmlns:a16="http://schemas.microsoft.com/office/drawing/2014/main" id="{0157A4EC-CDB3-5573-EDDD-1EEA67930684}"/>
+              </a:ext>
+            </a:extLst>
+          </p:cNvPr>
+          <p:cNvSpPr>
+            <a:spLocks noGrp="1"/>
+          </p:cNvSpPr>
+          <p:nvPr>
+            <p:ph idx="1"/>
+          </p:nvPr>
+        </p:nvSpPr>
+        <p:spPr/>
+        <p:txBody>
+          <a:bodyPr/>
+          <a:lstStyle/>
+          <a:p>
+            <a:r>
+              <a:rPr lang="en-US" sz="3200" b="1" dirty="0"/>
+              <a:t>Single-mode trips</a:t>
+            </a:r>
+          </a:p>
+          <a:p>
+            <a:r>
+              <a:rPr lang="en-US" dirty="0"/>
+              <a:t>76.68% (2007) vs 70.47% (2017, excluding walking) </a:t>
+            </a:r>
+          </a:p>
+          <a:p>
+            <a:r>
+              <a:rPr lang="en-US" dirty="0"/>
+              <a:t>76.68% (2007) vs 79.25% (2017, including walking)</a:t>
+            </a:r>
+          </a:p>
+          <a:p>
+            <a:endParaRPr lang="en-US" dirty="0"/>
+          </a:p>
+        </p:txBody>
+      </p:sp>
+    </p:spTree>
+    <p:extLst>
+      <p:ext uri="{BB962C8B-B14F-4D97-AF65-F5344CB8AC3E}">
+        <p14:creationId xmlns:p14="http://schemas.microsoft.com/office/powerpoint/2010/main" val="1028680165"/>
+      </p:ext>
+    </p:extLst>
+  </p:cSld>
+  <p:clrMapOvr>
+    <a:masterClrMapping/>
+  </p:clrMapOvr>
+</p:sld>
+</file>
+
+<file path=ppt/slides/slide11.xml><?xml version="1.0" encoding="utf-8"?>
+<p:sld xmlns:a="http://schemas.openxmlformats.org/drawingml/2006/main" xmlns:r="http://schemas.openxmlformats.org/officeDocument/2006/relationships" xmlns:p="http://schemas.openxmlformats.org/presentationml/2006/main">
+  <p:cSld>
+    <p:bg>
+      <p:bgPr>
+        <a:solidFill>
+          <a:schemeClr val="bg1"/>
+        </a:solidFill>
+        <a:effectLst/>
+      </p:bgPr>
+    </p:bg>
+    <p:spTree>
+      <p:nvGrpSpPr>
+        <p:cNvPr id="1" name=""/>
+        <p:cNvGrpSpPr/>
+        <p:nvPr/>
+      </p:nvGrpSpPr>
+      <p:grpSpPr>
+        <a:xfrm>
+          <a:off x="0" y="0"/>
+          <a:ext cx="0" cy="0"/>
+          <a:chOff x="0" y="0"/>
+          <a:chExt cx="0" cy="0"/>
+        </a:xfrm>
+      </p:grpSpPr>
+      <p:sp>
+        <p:nvSpPr>
+          <p:cNvPr id="12" name="Rectangle 11">
+            <a:extLst>
+              <a:ext uri="{FF2B5EF4-FFF2-40B4-BE49-F238E27FC236}">
+                <a16:creationId xmlns:a16="http://schemas.microsoft.com/office/drawing/2014/main" id="{7F3E6F82-836B-858F-ADED-19E9A71A0081}"/>
+              </a:ext>
+              <a:ext uri="{C183D7F6-B498-43B3-948B-1728B52AA6E4}">
+                <adec:decorative xmlns:adec="http://schemas.microsoft.com/office/drawing/2017/decorative" val="1"/>
+              </a:ext>
+            </a:extLst>
+          </p:cNvPr>
+          <p:cNvSpPr>
+            <a:spLocks noGrp="1" noRot="1" noChangeAspect="1" noMove="1" noResize="1" noEditPoints="1" noAdjustHandles="1" noChangeArrowheads="1" noChangeShapeType="1" noTextEdit="1"/>
+          </p:cNvSpPr>
+          <p:nvPr>
+            <p:extLst>
+              <p:ext uri="{386F3935-93C4-4BCD-93E2-E3B085C9AB24}">
+                <p16:designElem xmlns:p16="http://schemas.microsoft.com/office/powerpoint/2015/main" val="1"/>
+              </p:ext>
+            </p:extLst>
+          </p:nvPr>
+        </p:nvSpPr>
+        <p:spPr>
+          <a:xfrm>
+            <a:off x="0" y="0"/>
+            <a:ext cx="12192000" cy="6858000"/>
+          </a:xfrm>
+          <a:prstGeom prst="rect">
+            <a:avLst/>
+          </a:prstGeom>
+          <a:solidFill>
+            <a:schemeClr val="bg1"/>
+          </a:solidFill>
+          <a:ln w="12700" cap="flat" cmpd="sng" algn="ctr">
+            <a:noFill/>
+            <a:prstDash val="solid"/>
+            <a:miter lim="800000"/>
+          </a:ln>
+          <a:effectLst/>
+          <a:extLst>
+            <a:ext uri="{91240B29-F687-4F45-9708-019B960494DF}">
+              <a14:hiddenLine xmlns:a14="http://schemas.microsoft.com/office/drawing/2010/main" w="12700" cap="flat" cmpd="sng" algn="ctr">
+                <a:solidFill>
+                  <a:schemeClr val="accent1">
+                    <a:shade val="15000"/>
+                  </a:schemeClr>
+                </a:solidFill>
+                <a:prstDash val="solid"/>
+                <a:miter lim="800000"/>
+              </a14:hiddenLine>
+            </a:ext>
+          </a:extLst>
+        </p:spPr>
+        <p:style>
+          <a:lnRef idx="2">
+            <a:schemeClr val="accent1">
+              <a:shade val="15000"/>
+            </a:schemeClr>
+          </a:lnRef>
+          <a:fillRef idx="1">
+            <a:schemeClr val="accent1"/>
+          </a:fillRef>
+          <a:effectRef idx="0">
+            <a:schemeClr val="accent1"/>
+          </a:effectRef>
+          <a:fontRef idx="minor">
+            <a:schemeClr val="lt1"/>
+          </a:fontRef>
+        </p:style>
+        <p:txBody>
+          <a:bodyPr rtlCol="0" anchor="ctr"/>
+          <a:lstStyle/>
+          <a:p>
+            <a:pPr algn="ctr"/>
+            <a:endParaRPr lang="en-US"/>
+          </a:p>
+        </p:txBody>
+      </p:sp>
+      <p:sp>
+        <p:nvSpPr>
+          <p:cNvPr id="2" name="Title 1">
+            <a:extLst>
+              <a:ext uri="{FF2B5EF4-FFF2-40B4-BE49-F238E27FC236}">
+                <a16:creationId xmlns:a16="http://schemas.microsoft.com/office/drawing/2014/main" id="{7F8AB78B-86E9-A829-F86D-BB51CE7AF98E}"/>
+              </a:ext>
+            </a:extLst>
+          </p:cNvPr>
+          <p:cNvSpPr>
+            <a:spLocks noGrp="1"/>
+          </p:cNvSpPr>
+          <p:nvPr>
+            <p:ph type="title"/>
+          </p:nvPr>
+        </p:nvSpPr>
+        <p:spPr>
+          <a:xfrm>
+            <a:off x="1729740" y="454924"/>
+            <a:ext cx="8732520" cy="905256"/>
+          </a:xfrm>
+        </p:spPr>
+        <p:txBody>
+          <a:bodyPr vert="horz" lIns="91440" tIns="45720" rIns="91440" bIns="45720" rtlCol="0" anchor="b">
+            <a:normAutofit/>
+          </a:bodyPr>
+          <a:lstStyle/>
+          <a:p>
+            <a:pPr algn="ctr"/>
+            <a:r>
+              <a:rPr lang="en-US" sz="2800"/>
+              <a:t>2007 vs 2017 single-mode weighted trip distribution</a:t>
+            </a:r>
+          </a:p>
+        </p:txBody>
+      </p:sp>
+      <p:pic>
+        <p:nvPicPr>
+          <p:cNvPr id="7" name="Picture 6" descr="A graph of different colored bars&#10;&#10;AI-generated content may be incorrect.">
+            <a:extLst>
+              <a:ext uri="{FF2B5EF4-FFF2-40B4-BE49-F238E27FC236}">
+                <a16:creationId xmlns:a16="http://schemas.microsoft.com/office/drawing/2014/main" id="{0E0F09BB-FC5C-1245-50F2-26565953E031}"/>
+              </a:ext>
+            </a:extLst>
+          </p:cNvPr>
+          <p:cNvPicPr>
+            <a:picLocks noChangeAspect="1"/>
+          </p:cNvPicPr>
+          <p:nvPr/>
+        </p:nvPicPr>
+        <p:blipFill>
+          <a:blip r:embed="rId2"/>
+          <a:stretch>
+            <a:fillRect/>
+          </a:stretch>
+        </p:blipFill>
+        <p:spPr>
+          <a:xfrm>
+            <a:off x="6601681" y="2362952"/>
+            <a:ext cx="5297213" cy="3840480"/>
+          </a:xfrm>
+          <a:prstGeom prst="rect">
+            <a:avLst/>
+          </a:prstGeom>
+        </p:spPr>
+      </p:pic>
+      <p:pic>
+        <p:nvPicPr>
+          <p:cNvPr id="5" name="Content Placeholder 4" descr="A graph with different colored bars&#10;&#10;AI-generated content may be incorrect.">
+            <a:extLst>
+              <a:ext uri="{FF2B5EF4-FFF2-40B4-BE49-F238E27FC236}">
+                <a16:creationId xmlns:a16="http://schemas.microsoft.com/office/drawing/2014/main" id="{3B9FD19F-74F8-3A6B-F4C2-F477811CDC44}"/>
+              </a:ext>
+            </a:extLst>
+          </p:cNvPr>
+          <p:cNvPicPr>
+            <a:picLocks noGrp="1" noChangeAspect="1"/>
+          </p:cNvPicPr>
+          <p:nvPr>
+            <p:ph idx="1"/>
+          </p:nvPr>
+        </p:nvPicPr>
+        <p:blipFill>
+          <a:blip r:embed="rId3"/>
+          <a:stretch>
+            <a:fillRect/>
+          </a:stretch>
+        </p:blipFill>
+        <p:spPr>
+          <a:xfrm>
+            <a:off x="916128" y="2362952"/>
+            <a:ext cx="5297213" cy="3840480"/>
+          </a:xfrm>
+          <a:prstGeom prst="rect">
+            <a:avLst/>
+          </a:prstGeom>
+        </p:spPr>
+      </p:pic>
+    </p:spTree>
+    <p:extLst>
+      <p:ext uri="{BB962C8B-B14F-4D97-AF65-F5344CB8AC3E}">
+        <p14:creationId xmlns:p14="http://schemas.microsoft.com/office/powerpoint/2010/main" val="1109459712"/>
+      </p:ext>
+    </p:extLst>
+  </p:cSld>
+  <p:clrMapOvr>
+    <a:masterClrMapping/>
+  </p:clrMapOvr>
+</p:sld>
+</file>
+
+<file path=ppt/slides/slide12.xml><?xml version="1.0" encoding="utf-8"?>
+<p:sld xmlns:a="http://schemas.openxmlformats.org/drawingml/2006/main" xmlns:r="http://schemas.openxmlformats.org/officeDocument/2006/relationships" xmlns:p="http://schemas.openxmlformats.org/presentationml/2006/main">
+  <p:cSld>
+    <p:spTree>
+      <p:nvGrpSpPr>
+        <p:cNvPr id="1" name=""/>
+        <p:cNvGrpSpPr/>
+        <p:nvPr/>
+      </p:nvGrpSpPr>
+      <p:grpSpPr>
+        <a:xfrm>
+          <a:off x="0" y="0"/>
+          <a:ext cx="0" cy="0"/>
+          <a:chOff x="0" y="0"/>
+          <a:chExt cx="0" cy="0"/>
+        </a:xfrm>
+      </p:grpSpPr>
+      <p:sp>
+        <p:nvSpPr>
+          <p:cNvPr id="2" name="Title 1">
+            <a:extLst>
+              <a:ext uri="{FF2B5EF4-FFF2-40B4-BE49-F238E27FC236}">
+                <a16:creationId xmlns:a16="http://schemas.microsoft.com/office/drawing/2014/main" id="{998B832F-AB79-BA40-7E7D-F94F23362023}"/>
+              </a:ext>
+            </a:extLst>
+          </p:cNvPr>
+          <p:cNvSpPr>
+            <a:spLocks noGrp="1"/>
+          </p:cNvSpPr>
+          <p:nvPr>
+            <p:ph type="title"/>
+          </p:nvPr>
+        </p:nvSpPr>
+        <p:spPr/>
+        <p:txBody>
+          <a:bodyPr/>
+          <a:lstStyle/>
+          <a:p>
+            <a:r>
+              <a:rPr lang="en-US" dirty="0"/>
+              <a:t>Single-trip Metro vs multimodal Metro (2007)</a:t>
+            </a:r>
+          </a:p>
+        </p:txBody>
+      </p:sp>
+      <p:sp>
+        <p:nvSpPr>
+          <p:cNvPr id="3" name="Content Placeholder 2">
+            <a:extLst>
+              <a:ext uri="{FF2B5EF4-FFF2-40B4-BE49-F238E27FC236}">
+                <a16:creationId xmlns:a16="http://schemas.microsoft.com/office/drawing/2014/main" id="{224975C0-EC62-9FF0-2DE0-09FFDC479FCF}"/>
+              </a:ext>
+            </a:extLst>
+          </p:cNvPr>
+          <p:cNvSpPr>
+            <a:spLocks noGrp="1"/>
+          </p:cNvSpPr>
+          <p:nvPr>
+            <p:ph idx="1"/>
+          </p:nvPr>
+        </p:nvSpPr>
+        <p:spPr/>
+        <p:txBody>
+          <a:bodyPr/>
+          <a:lstStyle/>
+          <a:p>
+            <a:r>
+              <a:rPr lang="en-US" dirty="0"/>
+              <a:t>5.94% vs 19.66%</a:t>
+            </a:r>
+          </a:p>
+        </p:txBody>
+      </p:sp>
+      <p:pic>
+        <p:nvPicPr>
+          <p:cNvPr id="5" name="Picture 4" descr="A graph with numbers and text&#10;&#10;AI-generated content may be incorrect.">
+            <a:extLst>
+              <a:ext uri="{FF2B5EF4-FFF2-40B4-BE49-F238E27FC236}">
+                <a16:creationId xmlns:a16="http://schemas.microsoft.com/office/drawing/2014/main" id="{9B3BB3B3-059A-57A2-BC8E-4A07687AA184}"/>
+              </a:ext>
+            </a:extLst>
+          </p:cNvPr>
+          <p:cNvPicPr>
+            <a:picLocks noChangeAspect="1"/>
+          </p:cNvPicPr>
+          <p:nvPr/>
+        </p:nvPicPr>
+        <p:blipFill>
+          <a:blip r:embed="rId2"/>
+          <a:stretch>
+            <a:fillRect/>
+          </a:stretch>
+        </p:blipFill>
+        <p:spPr>
+          <a:xfrm>
+            <a:off x="2209800" y="2153452"/>
+            <a:ext cx="7772400" cy="4450254"/>
+          </a:xfrm>
+          <a:prstGeom prst="rect">
+            <a:avLst/>
+          </a:prstGeom>
+        </p:spPr>
+      </p:pic>
+    </p:spTree>
+    <p:extLst>
+      <p:ext uri="{BB962C8B-B14F-4D97-AF65-F5344CB8AC3E}">
+        <p14:creationId xmlns:p14="http://schemas.microsoft.com/office/powerpoint/2010/main" val="2101538926"/>
+      </p:ext>
+    </p:extLst>
+  </p:cSld>
+  <p:clrMapOvr>
+    <a:masterClrMapping/>
+  </p:clrMapOvr>
+</p:sld>
+</file>
+
+<file path=ppt/slides/slide13.xml><?xml version="1.0" encoding="utf-8"?>
+<p:sld xmlns:a="http://schemas.openxmlformats.org/drawingml/2006/main" xmlns:r="http://schemas.openxmlformats.org/officeDocument/2006/relationships" xmlns:p="http://schemas.openxmlformats.org/presentationml/2006/main">
+  <p:cSld>
+    <p:spTree>
+      <p:nvGrpSpPr>
+        <p:cNvPr id="1" name="">
+          <a:extLst>
+            <a:ext uri="{FF2B5EF4-FFF2-40B4-BE49-F238E27FC236}">
+              <a16:creationId xmlns:a16="http://schemas.microsoft.com/office/drawing/2014/main" id="{1FC10DFA-49C9-A8AF-890B-7AA64999CD27}"/>
+            </a:ext>
+          </a:extLst>
+        </p:cNvPr>
+        <p:cNvGrpSpPr/>
+        <p:nvPr/>
+      </p:nvGrpSpPr>
+      <p:grpSpPr>
+        <a:xfrm>
+          <a:off x="0" y="0"/>
+          <a:ext cx="0" cy="0"/>
+          <a:chOff x="0" y="0"/>
+          <a:chExt cx="0" cy="0"/>
+        </a:xfrm>
+      </p:grpSpPr>
+      <p:sp>
+        <p:nvSpPr>
+          <p:cNvPr id="2" name="Title 1">
+            <a:extLst>
+              <a:ext uri="{FF2B5EF4-FFF2-40B4-BE49-F238E27FC236}">
+                <a16:creationId xmlns:a16="http://schemas.microsoft.com/office/drawing/2014/main" id="{D83C8DBA-24F3-20A6-B0FC-D3A29D142734}"/>
+              </a:ext>
+            </a:extLst>
+          </p:cNvPr>
+          <p:cNvSpPr>
+            <a:spLocks noGrp="1"/>
+          </p:cNvSpPr>
+          <p:nvPr>
+            <p:ph type="title"/>
+          </p:nvPr>
+        </p:nvSpPr>
+        <p:spPr/>
+        <p:txBody>
+          <a:bodyPr/>
+          <a:lstStyle/>
+          <a:p>
+            <a:r>
+              <a:rPr lang="en-US" dirty="0"/>
+              <a:t>Single-trip Metro vs multimodal Metro (2017)</a:t>
+            </a:r>
+          </a:p>
+        </p:txBody>
+      </p:sp>
+      <p:sp>
+        <p:nvSpPr>
+          <p:cNvPr id="3" name="Content Placeholder 2">
+            <a:extLst>
+              <a:ext uri="{FF2B5EF4-FFF2-40B4-BE49-F238E27FC236}">
+                <a16:creationId xmlns:a16="http://schemas.microsoft.com/office/drawing/2014/main" id="{D7A0CDFC-3B4F-E457-8DC5-EFAFBC6B878D}"/>
+              </a:ext>
+            </a:extLst>
+          </p:cNvPr>
+          <p:cNvSpPr>
+            <a:spLocks noGrp="1"/>
+          </p:cNvSpPr>
+          <p:nvPr>
+            <p:ph idx="1"/>
+          </p:nvPr>
+        </p:nvSpPr>
+        <p:spPr/>
+        <p:txBody>
+          <a:bodyPr/>
+          <a:lstStyle/>
+          <a:p>
+            <a:r>
+              <a:rPr lang="en-US" dirty="0"/>
+              <a:t>3.44% vs 22.71%</a:t>
+            </a:r>
+          </a:p>
+        </p:txBody>
+      </p:sp>
+      <p:pic>
+        <p:nvPicPr>
+          <p:cNvPr id="6" name="Picture 5" descr="A graph with numbers and a bar&#10;&#10;AI-generated content may be incorrect.">
+            <a:extLst>
+              <a:ext uri="{FF2B5EF4-FFF2-40B4-BE49-F238E27FC236}">
+                <a16:creationId xmlns:a16="http://schemas.microsoft.com/office/drawing/2014/main" id="{B7D8B06D-D99E-2AE1-8E3D-B769BC3F60D2}"/>
+              </a:ext>
+            </a:extLst>
+          </p:cNvPr>
+          <p:cNvPicPr>
+            <a:picLocks noChangeAspect="1"/>
+          </p:cNvPicPr>
+          <p:nvPr/>
+        </p:nvPicPr>
+        <p:blipFill>
+          <a:blip r:embed="rId3"/>
+          <a:stretch>
+            <a:fillRect/>
+          </a:stretch>
+        </p:blipFill>
+        <p:spPr>
+          <a:xfrm>
+            <a:off x="2209800" y="2297831"/>
+            <a:ext cx="7772400" cy="4450254"/>
+          </a:xfrm>
+          <a:prstGeom prst="rect">
+            <a:avLst/>
+          </a:prstGeom>
+        </p:spPr>
+      </p:pic>
+    </p:spTree>
+    <p:extLst>
+      <p:ext uri="{BB962C8B-B14F-4D97-AF65-F5344CB8AC3E}">
+        <p14:creationId xmlns:p14="http://schemas.microsoft.com/office/powerpoint/2010/main" val="1097237163"/>
+      </p:ext>
+    </p:extLst>
+  </p:cSld>
+  <p:clrMapOvr>
+    <a:masterClrMapping/>
+  </p:clrMapOvr>
+</p:sld>
+</file>
+
+<file path=ppt/slides/slide14.xml><?xml version="1.0" encoding="utf-8"?>
+<p:sld xmlns:a="http://schemas.openxmlformats.org/drawingml/2006/main" xmlns:r="http://schemas.openxmlformats.org/officeDocument/2006/relationships" xmlns:p="http://schemas.openxmlformats.org/presentationml/2006/main">
+  <p:cSld>
+    <p:bg>
+      <p:bgPr>
+        <a:solidFill>
+          <a:schemeClr val="bg1"/>
+        </a:solidFill>
+        <a:effectLst/>
+      </p:bgPr>
+    </p:bg>
+    <p:spTree>
+      <p:nvGrpSpPr>
+        <p:cNvPr id="1" name=""/>
+        <p:cNvGrpSpPr/>
+        <p:nvPr/>
+      </p:nvGrpSpPr>
+      <p:grpSpPr>
+        <a:xfrm>
+          <a:off x="0" y="0"/>
+          <a:ext cx="0" cy="0"/>
+          <a:chOff x="0" y="0"/>
+          <a:chExt cx="0" cy="0"/>
+        </a:xfrm>
+      </p:grpSpPr>
+      <p:sp>
+        <p:nvSpPr>
+          <p:cNvPr id="10" name="Rectangle 9">
+            <a:extLst>
+              <a:ext uri="{FF2B5EF4-FFF2-40B4-BE49-F238E27FC236}">
+                <a16:creationId xmlns:a16="http://schemas.microsoft.com/office/drawing/2014/main" id="{35A92A98-187D-1D81-86FD-8D40CC69B622}"/>
+              </a:ext>
+              <a:ext uri="{C183D7F6-B498-43B3-948B-1728B52AA6E4}">
+                <adec:decorative xmlns:adec="http://schemas.microsoft.com/office/drawing/2017/decorative" val="1"/>
+              </a:ext>
+            </a:extLst>
+          </p:cNvPr>
+          <p:cNvSpPr>
+            <a:spLocks noGrp="1" noRot="1" noChangeAspect="1" noMove="1" noResize="1" noEditPoints="1" noAdjustHandles="1" noChangeArrowheads="1" noChangeShapeType="1" noTextEdit="1"/>
+          </p:cNvSpPr>
+          <p:nvPr>
+            <p:extLst>
+              <p:ext uri="{386F3935-93C4-4BCD-93E2-E3B085C9AB24}">
+                <p16:designElem xmlns:p16="http://schemas.microsoft.com/office/powerpoint/2015/main" val="1"/>
+              </p:ext>
+            </p:extLst>
+          </p:nvPr>
+        </p:nvSpPr>
+        <p:spPr>
+          <a:xfrm>
+            <a:off x="0" y="0"/>
+            <a:ext cx="12192000" cy="6858000"/>
+          </a:xfrm>
+          <a:prstGeom prst="rect">
+            <a:avLst/>
+          </a:prstGeom>
+          <a:solidFill>
+            <a:schemeClr val="bg1"/>
+          </a:solidFill>
+          <a:ln w="12700" cap="flat" cmpd="sng" algn="ctr">
+            <a:noFill/>
+            <a:prstDash val="solid"/>
+            <a:miter lim="800000"/>
+          </a:ln>
+          <a:effectLst/>
+          <a:extLst>
+            <a:ext uri="{91240B29-F687-4F45-9708-019B960494DF}">
+              <a14:hiddenLine xmlns:a14="http://schemas.microsoft.com/office/drawing/2010/main" w="12700" cap="flat" cmpd="sng" algn="ctr">
+                <a:solidFill>
+                  <a:schemeClr val="accent1">
+                    <a:shade val="15000"/>
+                  </a:schemeClr>
+                </a:solidFill>
+                <a:prstDash val="solid"/>
+                <a:miter lim="800000"/>
+              </a14:hiddenLine>
+            </a:ext>
+          </a:extLst>
+        </p:spPr>
+        <p:style>
+          <a:lnRef idx="2">
+            <a:schemeClr val="accent1">
+              <a:shade val="15000"/>
+            </a:schemeClr>
+          </a:lnRef>
+          <a:fillRef idx="1">
+            <a:schemeClr val="accent1"/>
+          </a:fillRef>
+          <a:effectRef idx="0">
+            <a:schemeClr val="accent1"/>
+          </a:effectRef>
+          <a:fontRef idx="minor">
+            <a:schemeClr val="lt1"/>
+          </a:fontRef>
+        </p:style>
+        <p:txBody>
+          <a:bodyPr rtlCol="0" anchor="ctr"/>
+          <a:lstStyle/>
+          <a:p>
+            <a:pPr algn="ctr"/>
+            <a:endParaRPr lang="en-US"/>
+          </a:p>
+        </p:txBody>
+      </p:sp>
+      <p:sp>
+        <p:nvSpPr>
+          <p:cNvPr id="2" name="Title 1">
+            <a:extLst>
+              <a:ext uri="{FF2B5EF4-FFF2-40B4-BE49-F238E27FC236}">
+                <a16:creationId xmlns:a16="http://schemas.microsoft.com/office/drawing/2014/main" id="{B9A99E35-5CDF-0A53-4655-5CB8538A6224}"/>
+              </a:ext>
+            </a:extLst>
+          </p:cNvPr>
+          <p:cNvSpPr>
+            <a:spLocks noGrp="1"/>
+          </p:cNvSpPr>
+          <p:nvPr>
+            <p:ph type="title"/>
+          </p:nvPr>
+        </p:nvSpPr>
+        <p:spPr>
+          <a:xfrm>
+            <a:off x="492940" y="473829"/>
+            <a:ext cx="11294162" cy="1170252"/>
+          </a:xfrm>
+        </p:spPr>
+        <p:txBody>
+          <a:bodyPr vert="horz" lIns="91440" tIns="45720" rIns="91440" bIns="45720" rtlCol="0" anchor="b">
+            <a:normAutofit/>
+          </a:bodyPr>
+          <a:lstStyle/>
+          <a:p>
+            <a:r>
+              <a:rPr lang="en-US" sz="3700"/>
+              <a:t>Metro multimodal trip comparison (weighted)</a:t>
+            </a:r>
+          </a:p>
+        </p:txBody>
+      </p:sp>
+      <p:pic>
+        <p:nvPicPr>
+          <p:cNvPr id="5" name="Picture 4" descr="A graph with numbers and a bar&#10;&#10;AI-generated content may be incorrect.">
+            <a:extLst>
+              <a:ext uri="{FF2B5EF4-FFF2-40B4-BE49-F238E27FC236}">
+                <a16:creationId xmlns:a16="http://schemas.microsoft.com/office/drawing/2014/main" id="{67DFD3D9-0DD9-9D71-2198-7F14F712169E}"/>
+              </a:ext>
+            </a:extLst>
+          </p:cNvPr>
+          <p:cNvPicPr>
+            <a:picLocks noChangeAspect="1"/>
+          </p:cNvPicPr>
+          <p:nvPr/>
+        </p:nvPicPr>
+        <p:blipFill>
+          <a:blip r:embed="rId2"/>
+          <a:stretch>
+            <a:fillRect/>
+          </a:stretch>
+        </p:blipFill>
+        <p:spPr>
+          <a:xfrm>
+            <a:off x="6227550" y="1991969"/>
+            <a:ext cx="5559552" cy="3182843"/>
+          </a:xfrm>
+          <a:prstGeom prst="rect">
+            <a:avLst/>
+          </a:prstGeom>
+        </p:spPr>
+      </p:pic>
+      <p:pic>
+        <p:nvPicPr>
+          <p:cNvPr id="4" name="Picture 3" descr="A graph with numbers and text&#10;&#10;AI-generated content may be incorrect.">
+            <a:extLst>
+              <a:ext uri="{FF2B5EF4-FFF2-40B4-BE49-F238E27FC236}">
+                <a16:creationId xmlns:a16="http://schemas.microsoft.com/office/drawing/2014/main" id="{80970368-4968-C7A1-5AEC-3293B07C853F}"/>
+              </a:ext>
+            </a:extLst>
+          </p:cNvPr>
+          <p:cNvPicPr>
+            <a:picLocks noChangeAspect="1"/>
+          </p:cNvPicPr>
+          <p:nvPr/>
+        </p:nvPicPr>
+        <p:blipFill>
+          <a:blip r:embed="rId3"/>
+          <a:stretch>
+            <a:fillRect/>
+          </a:stretch>
+        </p:blipFill>
+        <p:spPr>
+          <a:xfrm>
+            <a:off x="333999" y="1991969"/>
+            <a:ext cx="5559552" cy="3182843"/>
+          </a:xfrm>
+          <a:prstGeom prst="rect">
+            <a:avLst/>
+          </a:prstGeom>
+        </p:spPr>
+      </p:pic>
+    </p:spTree>
+    <p:extLst>
+      <p:ext uri="{BB962C8B-B14F-4D97-AF65-F5344CB8AC3E}">
+        <p14:creationId xmlns:p14="http://schemas.microsoft.com/office/powerpoint/2010/main" val="3922217196"/>
+      </p:ext>
+    </p:extLst>
+  </p:cSld>
+  <p:clrMapOvr>
+    <a:masterClrMapping/>
+  </p:clrMapOvr>
+</p:sld>
+</file>
+
+<file path=ppt/slides/slide15.xml><?xml version="1.0" encoding="utf-8"?>
+<p:sld xmlns:a="http://schemas.openxmlformats.org/drawingml/2006/main" xmlns:r="http://schemas.openxmlformats.org/officeDocument/2006/relationships" xmlns:p="http://schemas.openxmlformats.org/presentationml/2006/main">
+  <p:cSld>
+    <p:bg>
+      <p:bgPr>
+        <a:solidFill>
+          <a:schemeClr val="bg1"/>
+        </a:solidFill>
+        <a:effectLst/>
+      </p:bgPr>
+    </p:bg>
+    <p:spTree>
+      <p:nvGrpSpPr>
+        <p:cNvPr id="1" name=""/>
+        <p:cNvGrpSpPr/>
+        <p:nvPr/>
+      </p:nvGrpSpPr>
+      <p:grpSpPr>
+        <a:xfrm>
+          <a:off x="0" y="0"/>
+          <a:ext cx="0" cy="0"/>
+          <a:chOff x="0" y="0"/>
+          <a:chExt cx="0" cy="0"/>
+        </a:xfrm>
+      </p:grpSpPr>
+      <p:sp>
+        <p:nvSpPr>
+          <p:cNvPr id="12" name="Rectangle 11">
+            <a:extLst>
+              <a:ext uri="{FF2B5EF4-FFF2-40B4-BE49-F238E27FC236}">
+                <a16:creationId xmlns:a16="http://schemas.microsoft.com/office/drawing/2014/main" id="{35A92A98-187D-1D81-86FD-8D40CC69B622}"/>
+              </a:ext>
+              <a:ext uri="{C183D7F6-B498-43B3-948B-1728B52AA6E4}">
+                <adec:decorative xmlns:adec="http://schemas.microsoft.com/office/drawing/2017/decorative" val="1"/>
+              </a:ext>
+            </a:extLst>
+          </p:cNvPr>
+          <p:cNvSpPr>
+            <a:spLocks noGrp="1" noRot="1" noChangeAspect="1" noMove="1" noResize="1" noEditPoints="1" noAdjustHandles="1" noChangeArrowheads="1" noChangeShapeType="1" noTextEdit="1"/>
+          </p:cNvSpPr>
+          <p:nvPr>
+            <p:extLst>
+              <p:ext uri="{386F3935-93C4-4BCD-93E2-E3B085C9AB24}">
+                <p16:designElem xmlns:p16="http://schemas.microsoft.com/office/powerpoint/2015/main" val="1"/>
+              </p:ext>
+            </p:extLst>
+          </p:nvPr>
+        </p:nvSpPr>
+        <p:spPr>
+          <a:xfrm>
+            <a:off x="0" y="0"/>
+            <a:ext cx="12192000" cy="6858000"/>
+          </a:xfrm>
+          <a:prstGeom prst="rect">
+            <a:avLst/>
+          </a:prstGeom>
+          <a:solidFill>
+            <a:schemeClr val="bg1"/>
+          </a:solidFill>
+          <a:ln w="12700" cap="flat" cmpd="sng" algn="ctr">
+            <a:noFill/>
+            <a:prstDash val="solid"/>
+            <a:miter lim="800000"/>
+          </a:ln>
+          <a:effectLst/>
+          <a:extLst>
+            <a:ext uri="{91240B29-F687-4F45-9708-019B960494DF}">
+              <a14:hiddenLine xmlns:a14="http://schemas.microsoft.com/office/drawing/2010/main" w="12700" cap="flat" cmpd="sng" algn="ctr">
+                <a:solidFill>
+                  <a:schemeClr val="accent1">
+                    <a:shade val="15000"/>
+                  </a:schemeClr>
+                </a:solidFill>
+                <a:prstDash val="solid"/>
+                <a:miter lim="800000"/>
+              </a14:hiddenLine>
+            </a:ext>
+          </a:extLst>
+        </p:spPr>
+        <p:style>
+          <a:lnRef idx="2">
+            <a:schemeClr val="accent1">
+              <a:shade val="15000"/>
+            </a:schemeClr>
+          </a:lnRef>
+          <a:fillRef idx="1">
+            <a:schemeClr val="accent1"/>
+          </a:fillRef>
+          <a:effectRef idx="0">
+            <a:schemeClr val="accent1"/>
+          </a:effectRef>
+          <a:fontRef idx="minor">
+            <a:schemeClr val="lt1"/>
+          </a:fontRef>
+        </p:style>
+        <p:txBody>
+          <a:bodyPr rtlCol="0" anchor="ctr"/>
+          <a:lstStyle/>
+          <a:p>
+            <a:pPr algn="ctr"/>
+            <a:endParaRPr lang="en-US"/>
+          </a:p>
+        </p:txBody>
+      </p:sp>
+      <p:sp>
+        <p:nvSpPr>
+          <p:cNvPr id="2" name="Title 1">
+            <a:extLst>
+              <a:ext uri="{FF2B5EF4-FFF2-40B4-BE49-F238E27FC236}">
+                <a16:creationId xmlns:a16="http://schemas.microsoft.com/office/drawing/2014/main" id="{B8065CE5-815E-92C2-5B81-38FFF83BC17A}"/>
+              </a:ext>
+            </a:extLst>
+          </p:cNvPr>
+          <p:cNvSpPr>
+            <a:spLocks noGrp="1"/>
+          </p:cNvSpPr>
+          <p:nvPr>
+            <p:ph type="title"/>
+          </p:nvPr>
+        </p:nvSpPr>
+        <p:spPr>
+          <a:xfrm>
+            <a:off x="492940" y="473829"/>
+            <a:ext cx="11294162" cy="1170252"/>
+          </a:xfrm>
+        </p:spPr>
+        <p:txBody>
+          <a:bodyPr vert="horz" lIns="91440" tIns="45720" rIns="91440" bIns="45720" rtlCol="0" anchor="b">
+            <a:normAutofit/>
+          </a:bodyPr>
+          <a:lstStyle/>
+          <a:p>
+            <a:r>
+              <a:rPr lang="en-US" sz="4000"/>
+              <a:t>BRT</a:t>
+            </a:r>
+          </a:p>
+        </p:txBody>
+      </p:sp>
+      <p:pic>
+        <p:nvPicPr>
+          <p:cNvPr id="5" name="Content Placeholder 4" descr="A graph with a yellow bar&#10;&#10;AI-generated content may be incorrect.">
+            <a:extLst>
+              <a:ext uri="{FF2B5EF4-FFF2-40B4-BE49-F238E27FC236}">
+                <a16:creationId xmlns:a16="http://schemas.microsoft.com/office/drawing/2014/main" id="{99DAF57A-2C68-2FBF-6661-166C24D469FD}"/>
+              </a:ext>
+            </a:extLst>
+          </p:cNvPr>
+          <p:cNvPicPr>
+            <a:picLocks noGrp="1" noChangeAspect="1"/>
+          </p:cNvPicPr>
+          <p:nvPr>
+            <p:ph idx="1"/>
+          </p:nvPr>
+        </p:nvPicPr>
+        <p:blipFill>
+          <a:blip r:embed="rId2"/>
+          <a:stretch>
+            <a:fillRect/>
+          </a:stretch>
+        </p:blipFill>
+        <p:spPr>
+          <a:xfrm>
+            <a:off x="6227550" y="2691223"/>
+            <a:ext cx="5559552" cy="2015337"/>
+          </a:xfrm>
+          <a:prstGeom prst="rect">
+            <a:avLst/>
+          </a:prstGeom>
+        </p:spPr>
+      </p:pic>
+      <p:pic>
+        <p:nvPicPr>
+          <p:cNvPr id="7" name="Picture 6" descr="A graph with a bar&#10;&#10;AI-generated content may be incorrect.">
+            <a:extLst>
+              <a:ext uri="{FF2B5EF4-FFF2-40B4-BE49-F238E27FC236}">
+                <a16:creationId xmlns:a16="http://schemas.microsoft.com/office/drawing/2014/main" id="{D95EB8C7-E105-B645-B19B-D7B2093AF925}"/>
+              </a:ext>
+            </a:extLst>
+          </p:cNvPr>
+          <p:cNvPicPr>
+            <a:picLocks noChangeAspect="1"/>
+          </p:cNvPicPr>
+          <p:nvPr/>
+        </p:nvPicPr>
+        <p:blipFill>
+          <a:blip r:embed="rId3"/>
+          <a:stretch>
+            <a:fillRect/>
+          </a:stretch>
+        </p:blipFill>
+        <p:spPr>
+          <a:xfrm>
+            <a:off x="404898" y="2691223"/>
+            <a:ext cx="5559552" cy="2015337"/>
+          </a:xfrm>
+          <a:prstGeom prst="rect">
+            <a:avLst/>
+          </a:prstGeom>
+        </p:spPr>
+      </p:pic>
+    </p:spTree>
+    <p:extLst>
+      <p:ext uri="{BB962C8B-B14F-4D97-AF65-F5344CB8AC3E}">
+        <p14:creationId xmlns:p14="http://schemas.microsoft.com/office/powerpoint/2010/main" val="3387788268"/>
+      </p:ext>
+    </p:extLst>
+  </p:cSld>
+  <p:clrMapOvr>
+    <a:masterClrMapping/>
+  </p:clrMapOvr>
+</p:sld>
+</file>
+
+<file path=ppt/slides/slide16.xml><?xml version="1.0" encoding="utf-8"?>
+<p:sld xmlns:a="http://schemas.openxmlformats.org/drawingml/2006/main" xmlns:r="http://schemas.openxmlformats.org/officeDocument/2006/relationships" xmlns:p="http://schemas.openxmlformats.org/presentationml/2006/main">
+  <p:cSld>
+    <p:bg>
+      <p:bgPr>
+        <a:solidFill>
+          <a:schemeClr val="bg1"/>
+        </a:solidFill>
+        <a:effectLst/>
+      </p:bgPr>
+    </p:bg>
+    <p:spTree>
+      <p:nvGrpSpPr>
+        <p:cNvPr id="1" name=""/>
+        <p:cNvGrpSpPr/>
+        <p:nvPr/>
+      </p:nvGrpSpPr>
+      <p:grpSpPr>
+        <a:xfrm>
+          <a:off x="0" y="0"/>
+          <a:ext cx="0" cy="0"/>
+          <a:chOff x="0" y="0"/>
+          <a:chExt cx="0" cy="0"/>
+        </a:xfrm>
+      </p:grpSpPr>
+      <p:sp>
+        <p:nvSpPr>
+          <p:cNvPr id="12" name="Rectangle 11">
+            <a:extLst>
+              <a:ext uri="{FF2B5EF4-FFF2-40B4-BE49-F238E27FC236}">
+                <a16:creationId xmlns:a16="http://schemas.microsoft.com/office/drawing/2014/main" id="{35A92A98-187D-1D81-86FD-8D40CC69B622}"/>
+              </a:ext>
+              <a:ext uri="{C183D7F6-B498-43B3-948B-1728B52AA6E4}">
+                <adec:decorative xmlns:adec="http://schemas.microsoft.com/office/drawing/2017/decorative" val="1"/>
+              </a:ext>
+            </a:extLst>
+          </p:cNvPr>
+          <p:cNvSpPr>
+            <a:spLocks noGrp="1" noRot="1" noChangeAspect="1" noMove="1" noResize="1" noEditPoints="1" noAdjustHandles="1" noChangeArrowheads="1" noChangeShapeType="1" noTextEdit="1"/>
+          </p:cNvSpPr>
+          <p:nvPr>
+            <p:extLst>
+              <p:ext uri="{386F3935-93C4-4BCD-93E2-E3B085C9AB24}">
+                <p16:designElem xmlns:p16="http://schemas.microsoft.com/office/powerpoint/2015/main" val="1"/>
+              </p:ext>
+            </p:extLst>
+          </p:nvPr>
+        </p:nvSpPr>
+        <p:spPr>
+          <a:xfrm>
+            <a:off x="0" y="0"/>
+            <a:ext cx="12192000" cy="6858000"/>
+          </a:xfrm>
+          <a:prstGeom prst="rect">
+            <a:avLst/>
+          </a:prstGeom>
+          <a:solidFill>
+            <a:schemeClr val="bg1"/>
+          </a:solidFill>
+          <a:ln w="12700" cap="flat" cmpd="sng" algn="ctr">
+            <a:noFill/>
+            <a:prstDash val="solid"/>
+            <a:miter lim="800000"/>
+          </a:ln>
+          <a:effectLst/>
+          <a:extLst>
+            <a:ext uri="{91240B29-F687-4F45-9708-019B960494DF}">
+              <a14:hiddenLine xmlns:a14="http://schemas.microsoft.com/office/drawing/2010/main" w="12700" cap="flat" cmpd="sng" algn="ctr">
+                <a:solidFill>
+                  <a:schemeClr val="accent1">
+                    <a:shade val="15000"/>
+                  </a:schemeClr>
+                </a:solidFill>
+                <a:prstDash val="solid"/>
+                <a:miter lim="800000"/>
+              </a14:hiddenLine>
+            </a:ext>
+          </a:extLst>
+        </p:spPr>
+        <p:style>
+          <a:lnRef idx="2">
+            <a:schemeClr val="accent1">
+              <a:shade val="15000"/>
+            </a:schemeClr>
+          </a:lnRef>
+          <a:fillRef idx="1">
+            <a:schemeClr val="accent1"/>
+          </a:fillRef>
+          <a:effectRef idx="0">
+            <a:schemeClr val="accent1"/>
+          </a:effectRef>
+          <a:fontRef idx="minor">
+            <a:schemeClr val="lt1"/>
+          </a:fontRef>
+        </p:style>
+        <p:txBody>
+          <a:bodyPr rtlCol="0" anchor="ctr"/>
+          <a:lstStyle/>
+          <a:p>
+            <a:pPr algn="ctr"/>
+            <a:endParaRPr lang="en-US"/>
+          </a:p>
+        </p:txBody>
+      </p:sp>
+      <p:sp>
+        <p:nvSpPr>
+          <p:cNvPr id="2" name="Title 1">
+            <a:extLst>
+              <a:ext uri="{FF2B5EF4-FFF2-40B4-BE49-F238E27FC236}">
+                <a16:creationId xmlns:a16="http://schemas.microsoft.com/office/drawing/2014/main" id="{6F95DD48-AE76-A403-FCA2-6DDCFDF87164}"/>
+              </a:ext>
+            </a:extLst>
+          </p:cNvPr>
+          <p:cNvSpPr>
+            <a:spLocks noGrp="1"/>
+          </p:cNvSpPr>
+          <p:nvPr>
+            <p:ph type="title"/>
+          </p:nvPr>
+        </p:nvSpPr>
+        <p:spPr>
+          <a:xfrm>
+            <a:off x="492940" y="473829"/>
+            <a:ext cx="11294162" cy="1170252"/>
+          </a:xfrm>
+        </p:spPr>
+        <p:txBody>
+          <a:bodyPr vert="horz" lIns="91440" tIns="45720" rIns="91440" bIns="45720" rtlCol="0" anchor="b">
+            <a:normAutofit/>
+          </a:bodyPr>
+          <a:lstStyle/>
+          <a:p>
+            <a:r>
+              <a:rPr lang="en-US" sz="4000"/>
+              <a:t>BUS</a:t>
+            </a:r>
+          </a:p>
+        </p:txBody>
+      </p:sp>
+      <p:pic>
+        <p:nvPicPr>
+          <p:cNvPr id="7" name="Picture 6" descr="A graph with a bar chart&#10;&#10;AI-generated content may be incorrect.">
+            <a:extLst>
+              <a:ext uri="{FF2B5EF4-FFF2-40B4-BE49-F238E27FC236}">
+                <a16:creationId xmlns:a16="http://schemas.microsoft.com/office/drawing/2014/main" id="{ADAE6940-7202-D448-725A-C59B7FC1885A}"/>
+              </a:ext>
+            </a:extLst>
+          </p:cNvPr>
+          <p:cNvPicPr>
+            <a:picLocks noChangeAspect="1"/>
+          </p:cNvPicPr>
+          <p:nvPr/>
+        </p:nvPicPr>
+        <p:blipFill>
+          <a:blip r:embed="rId2"/>
+          <a:stretch>
+            <a:fillRect/>
+          </a:stretch>
+        </p:blipFill>
+        <p:spPr>
+          <a:xfrm>
+            <a:off x="492940" y="2691225"/>
+            <a:ext cx="5559552" cy="2015337"/>
+          </a:xfrm>
+          <a:prstGeom prst="rect">
+            <a:avLst/>
+          </a:prstGeom>
+        </p:spPr>
+      </p:pic>
+      <p:pic>
+        <p:nvPicPr>
+          <p:cNvPr id="5" name="Picture 4" descr="A chart with a yellow and blue bar&#10;&#10;AI-generated content may be incorrect.">
+            <a:extLst>
+              <a:ext uri="{FF2B5EF4-FFF2-40B4-BE49-F238E27FC236}">
+                <a16:creationId xmlns:a16="http://schemas.microsoft.com/office/drawing/2014/main" id="{C081614B-C544-AE4A-4329-6886DD43FA8D}"/>
+              </a:ext>
+            </a:extLst>
+          </p:cNvPr>
+          <p:cNvPicPr>
+            <a:picLocks noChangeAspect="1"/>
+          </p:cNvPicPr>
+          <p:nvPr/>
+        </p:nvPicPr>
+        <p:blipFill>
+          <a:blip r:embed="rId3"/>
+          <a:stretch>
+            <a:fillRect/>
+          </a:stretch>
+        </p:blipFill>
+        <p:spPr>
+          <a:xfrm>
+            <a:off x="6210925" y="2906658"/>
+            <a:ext cx="5559552" cy="1584472"/>
+          </a:xfrm>
+          <a:prstGeom prst="rect">
+            <a:avLst/>
+          </a:prstGeom>
+        </p:spPr>
+      </p:pic>
+    </p:spTree>
+    <p:extLst>
+      <p:ext uri="{BB962C8B-B14F-4D97-AF65-F5344CB8AC3E}">
+        <p14:creationId xmlns:p14="http://schemas.microsoft.com/office/powerpoint/2010/main" val="286702453"/>
+      </p:ext>
+    </p:extLst>
+  </p:cSld>
+  <p:clrMapOvr>
+    <a:masterClrMapping/>
+  </p:clrMapOvr>
+</p:sld>
+</file>
+
+<file path=ppt/slides/slide17.xml><?xml version="1.0" encoding="utf-8"?>
+<p:sld xmlns:a="http://schemas.openxmlformats.org/drawingml/2006/main" xmlns:r="http://schemas.openxmlformats.org/officeDocument/2006/relationships" xmlns:p="http://schemas.openxmlformats.org/presentationml/2006/main">
+  <p:cSld>
+    <p:bg>
+      <p:bgPr>
+        <a:solidFill>
+          <a:schemeClr val="bg1"/>
+        </a:solidFill>
+        <a:effectLst/>
+      </p:bgPr>
+    </p:bg>
+    <p:spTree>
+      <p:nvGrpSpPr>
+        <p:cNvPr id="1" name=""/>
+        <p:cNvGrpSpPr/>
+        <p:nvPr/>
+      </p:nvGrpSpPr>
+      <p:grpSpPr>
+        <a:xfrm>
+          <a:off x="0" y="0"/>
+          <a:ext cx="0" cy="0"/>
+          <a:chOff x="0" y="0"/>
+          <a:chExt cx="0" cy="0"/>
+        </a:xfrm>
+      </p:grpSpPr>
+      <p:sp>
+        <p:nvSpPr>
+          <p:cNvPr id="12" name="Rectangle 11">
+            <a:extLst>
+              <a:ext uri="{FF2B5EF4-FFF2-40B4-BE49-F238E27FC236}">
+                <a16:creationId xmlns:a16="http://schemas.microsoft.com/office/drawing/2014/main" id="{35A92A98-187D-1D81-86FD-8D40CC69B622}"/>
+              </a:ext>
+              <a:ext uri="{C183D7F6-B498-43B3-948B-1728B52AA6E4}">
+                <adec:decorative xmlns:adec="http://schemas.microsoft.com/office/drawing/2017/decorative" val="1"/>
+              </a:ext>
+            </a:extLst>
+          </p:cNvPr>
+          <p:cNvSpPr>
+            <a:spLocks noGrp="1" noRot="1" noChangeAspect="1" noMove="1" noResize="1" noEditPoints="1" noAdjustHandles="1" noChangeArrowheads="1" noChangeShapeType="1" noTextEdit="1"/>
+          </p:cNvSpPr>
+          <p:nvPr>
+            <p:extLst>
+              <p:ext uri="{386F3935-93C4-4BCD-93E2-E3B085C9AB24}">
+                <p16:designElem xmlns:p16="http://schemas.microsoft.com/office/powerpoint/2015/main" val="1"/>
+              </p:ext>
+            </p:extLst>
+          </p:nvPr>
+        </p:nvSpPr>
+        <p:spPr>
+          <a:xfrm>
+            <a:off x="0" y="0"/>
+            <a:ext cx="12192000" cy="6858000"/>
+          </a:xfrm>
+          <a:prstGeom prst="rect">
+            <a:avLst/>
+          </a:prstGeom>
+          <a:solidFill>
+            <a:schemeClr val="bg1"/>
+          </a:solidFill>
+          <a:ln w="12700" cap="flat" cmpd="sng" algn="ctr">
+            <a:noFill/>
+            <a:prstDash val="solid"/>
+            <a:miter lim="800000"/>
+          </a:ln>
+          <a:effectLst/>
+          <a:extLst>
+            <a:ext uri="{91240B29-F687-4F45-9708-019B960494DF}">
+              <a14:hiddenLine xmlns:a14="http://schemas.microsoft.com/office/drawing/2010/main" w="12700" cap="flat" cmpd="sng" algn="ctr">
+                <a:solidFill>
+                  <a:schemeClr val="accent1">
+                    <a:shade val="15000"/>
+                  </a:schemeClr>
+                </a:solidFill>
+                <a:prstDash val="solid"/>
+                <a:miter lim="800000"/>
+              </a14:hiddenLine>
+            </a:ext>
+          </a:extLst>
+        </p:spPr>
+        <p:style>
+          <a:lnRef idx="2">
+            <a:schemeClr val="accent1">
+              <a:shade val="15000"/>
+            </a:schemeClr>
+          </a:lnRef>
+          <a:fillRef idx="1">
+            <a:schemeClr val="accent1"/>
+          </a:fillRef>
+          <a:effectRef idx="0">
+            <a:schemeClr val="accent1"/>
+          </a:effectRef>
+          <a:fontRef idx="minor">
+            <a:schemeClr val="lt1"/>
+          </a:fontRef>
+        </p:style>
+        <p:txBody>
+          <a:bodyPr rtlCol="0" anchor="ctr"/>
+          <a:lstStyle/>
+          <a:p>
+            <a:pPr algn="ctr"/>
+            <a:endParaRPr lang="en-US"/>
+          </a:p>
+        </p:txBody>
+      </p:sp>
+      <p:sp>
+        <p:nvSpPr>
+          <p:cNvPr id="2" name="Title 1">
+            <a:extLst>
+              <a:ext uri="{FF2B5EF4-FFF2-40B4-BE49-F238E27FC236}">
+                <a16:creationId xmlns:a16="http://schemas.microsoft.com/office/drawing/2014/main" id="{0D6782C6-FCF2-0D48-AF20-56228F8850AE}"/>
+              </a:ext>
+            </a:extLst>
+          </p:cNvPr>
+          <p:cNvSpPr>
+            <a:spLocks noGrp="1"/>
+          </p:cNvSpPr>
+          <p:nvPr>
+            <p:ph type="title"/>
+          </p:nvPr>
+        </p:nvSpPr>
+        <p:spPr>
+          <a:xfrm>
+            <a:off x="492940" y="473829"/>
+            <a:ext cx="11294162" cy="1170252"/>
+          </a:xfrm>
+        </p:spPr>
+        <p:txBody>
+          <a:bodyPr vert="horz" lIns="91440" tIns="45720" rIns="91440" bIns="45720" rtlCol="0" anchor="b">
+            <a:normAutofit/>
+          </a:bodyPr>
+          <a:lstStyle/>
+          <a:p>
+            <a:r>
+              <a:rPr lang="en-US" sz="3700"/>
+              <a:t>Bus only, High Capacity only, and bus +High Capacity</a:t>
+            </a:r>
+          </a:p>
+        </p:txBody>
+      </p:sp>
+      <p:pic>
+        <p:nvPicPr>
+          <p:cNvPr id="5" name="Picture 4" descr="A graph with a bar graph&#10;&#10;AI-generated content may be incorrect.">
+            <a:extLst>
+              <a:ext uri="{FF2B5EF4-FFF2-40B4-BE49-F238E27FC236}">
+                <a16:creationId xmlns:a16="http://schemas.microsoft.com/office/drawing/2014/main" id="{316D7325-1420-7507-E74A-4786E4E9619F}"/>
+              </a:ext>
+            </a:extLst>
+          </p:cNvPr>
+          <p:cNvPicPr>
+            <a:picLocks noChangeAspect="1"/>
+          </p:cNvPicPr>
+          <p:nvPr/>
+        </p:nvPicPr>
+        <p:blipFill>
+          <a:blip r:embed="rId2"/>
+          <a:stretch>
+            <a:fillRect/>
+          </a:stretch>
+        </p:blipFill>
+        <p:spPr>
+          <a:xfrm>
+            <a:off x="492940" y="2691225"/>
+            <a:ext cx="5559552" cy="2015337"/>
+          </a:xfrm>
+          <a:prstGeom prst="rect">
+            <a:avLst/>
+          </a:prstGeom>
+        </p:spPr>
+      </p:pic>
+      <p:pic>
+        <p:nvPicPr>
+          <p:cNvPr id="7" name="Picture 6" descr="A graph with a bar graph&#10;&#10;AI-generated content may be incorrect.">
+            <a:extLst>
+              <a:ext uri="{FF2B5EF4-FFF2-40B4-BE49-F238E27FC236}">
+                <a16:creationId xmlns:a16="http://schemas.microsoft.com/office/drawing/2014/main" id="{E10B16C5-B6AC-C84E-99AC-011A6A4C3E49}"/>
+              </a:ext>
+            </a:extLst>
+          </p:cNvPr>
+          <p:cNvPicPr>
+            <a:picLocks noChangeAspect="1"/>
+          </p:cNvPicPr>
+          <p:nvPr/>
+        </p:nvPicPr>
+        <p:blipFill>
+          <a:blip r:embed="rId3"/>
+          <a:stretch>
+            <a:fillRect/>
+          </a:stretch>
+        </p:blipFill>
+        <p:spPr>
+          <a:xfrm>
+            <a:off x="6210925" y="2691225"/>
+            <a:ext cx="5559552" cy="2015337"/>
+          </a:xfrm>
+          <a:prstGeom prst="rect">
+            <a:avLst/>
+          </a:prstGeom>
+        </p:spPr>
+      </p:pic>
+    </p:spTree>
+    <p:extLst>
+      <p:ext uri="{BB962C8B-B14F-4D97-AF65-F5344CB8AC3E}">
+        <p14:creationId xmlns:p14="http://schemas.microsoft.com/office/powerpoint/2010/main" val="3041218903"/>
+      </p:ext>
+    </p:extLst>
+  </p:cSld>
+  <p:clrMapOvr>
+    <a:masterClrMapping/>
+  </p:clrMapOvr>
+</p:sld>
+</file>
+
 <file path=ppt/slides/slide2.xml><?xml version="1.0" encoding="utf-8"?>
 <p:sld xmlns:a="http://schemas.openxmlformats.org/drawingml/2006/main" xmlns:r="http://schemas.openxmlformats.org/officeDocument/2006/relationships" xmlns:p="http://schemas.openxmlformats.org/presentationml/2006/main">
   <p:cSld>
@@ -5087,7 +6583,7 @@
           <a:p>
             <a:pPr algn="ctr"/>
             <a:r>
-              <a:rPr lang="en-US" sz="3700"/>
+              <a:rPr lang="en-US" sz="3700" dirty="0"/>
               <a:t>Metro multimodal trip comparison</a:t>
             </a:r>
           </a:p>
@@ -5727,7 +7223,7 @@
           <a:lstStyle/>
           <a:p>
             <a:r>
-              <a:rPr lang="en-US" sz="3700"/>
+              <a:rPr lang="en-US" sz="3700" dirty="0"/>
               <a:t>Bus only, High Capacity only, and bus +High Capacity</a:t>
             </a:r>
           </a:p>

</xml_diff>